<commit_message>
added exercies to slides 07
</commit_message>
<xml_diff>
--- a/slides/Programación con Python07.pptx
+++ b/slides/Programación con Python07.pptx
@@ -13,16 +13,18 @@
     <p:sldId id="276" r:id="rId7"/>
     <p:sldId id="277" r:id="rId8"/>
     <p:sldId id="278" r:id="rId9"/>
-    <p:sldId id="269" r:id="rId10"/>
-    <p:sldId id="285" r:id="rId11"/>
-    <p:sldId id="279" r:id="rId12"/>
-    <p:sldId id="273" r:id="rId13"/>
-    <p:sldId id="281" r:id="rId14"/>
-    <p:sldId id="282" r:id="rId15"/>
-    <p:sldId id="283" r:id="rId16"/>
-    <p:sldId id="286" r:id="rId17"/>
-    <p:sldId id="287" r:id="rId18"/>
-    <p:sldId id="288" r:id="rId19"/>
+    <p:sldId id="294" r:id="rId10"/>
+    <p:sldId id="269" r:id="rId11"/>
+    <p:sldId id="293" r:id="rId12"/>
+    <p:sldId id="285" r:id="rId13"/>
+    <p:sldId id="279" r:id="rId14"/>
+    <p:sldId id="273" r:id="rId15"/>
+    <p:sldId id="281" r:id="rId16"/>
+    <p:sldId id="282" r:id="rId17"/>
+    <p:sldId id="283" r:id="rId18"/>
+    <p:sldId id="286" r:id="rId19"/>
+    <p:sldId id="287" r:id="rId20"/>
+    <p:sldId id="288" r:id="rId21"/>
   </p:sldIdLst>
   <p:sldSz cx="12192000" cy="6858000"/>
   <p:notesSz cx="6858000" cy="9144000"/>
@@ -3456,59 +3458,104 @@
           <p:cNvPr id="2" name="Título 1">
             <a:extLst>
               <a:ext uri="{FF2B5EF4-FFF2-40B4-BE49-F238E27FC236}">
-                <a16:creationId xmlns:a16="http://schemas.microsoft.com/office/drawing/2014/main" id="{3A164C3F-57DB-4AF4-9798-390DF52ECD56}"/>
-              </a:ext>
-            </a:extLst>
-          </p:cNvPr>
-          <p:cNvSpPr>
-            <a:spLocks noGrp="1"/>
-          </p:cNvSpPr>
-          <p:nvPr>
-            <p:ph type="ctrTitle"/>
-          </p:nvPr>
-        </p:nvSpPr>
-        <p:spPr/>
-        <p:txBody>
-          <a:bodyPr/>
-          <a:lstStyle/>
-          <a:p>
-            <a:r>
-              <a:rPr lang="es-MX" dirty="0" err="1"/>
-              <a:t>IPython</a:t>
+                <a16:creationId xmlns:a16="http://schemas.microsoft.com/office/drawing/2014/main" id="{C994B06E-C4BF-40A1-884D-8AC9FD02393D}"/>
+              </a:ext>
+            </a:extLst>
+          </p:cNvPr>
+          <p:cNvSpPr>
+            <a:spLocks noGrp="1"/>
+          </p:cNvSpPr>
+          <p:nvPr>
+            <p:ph type="title"/>
+          </p:nvPr>
+        </p:nvSpPr>
+        <p:spPr/>
+        <p:txBody>
+          <a:bodyPr/>
+          <a:lstStyle/>
+          <a:p>
+            <a:r>
+              <a:rPr lang="es-MX" dirty="0"/>
+              <a:t>Caso de estudio:</a:t>
+            </a:r>
+          </a:p>
+        </p:txBody>
+      </p:sp>
+      <p:sp>
+        <p:nvSpPr>
+          <p:cNvPr id="3" name="Marcador de contenido 2">
+            <a:extLst>
+              <a:ext uri="{FF2B5EF4-FFF2-40B4-BE49-F238E27FC236}">
+                <a16:creationId xmlns:a16="http://schemas.microsoft.com/office/drawing/2014/main" id="{3A6F42A1-1A55-4BA7-AD66-8046D97BEEF7}"/>
+              </a:ext>
+            </a:extLst>
+          </p:cNvPr>
+          <p:cNvSpPr>
+            <a:spLocks noGrp="1"/>
+          </p:cNvSpPr>
+          <p:nvPr>
+            <p:ph idx="1"/>
+          </p:nvPr>
+        </p:nvSpPr>
+        <p:spPr/>
+        <p:txBody>
+          <a:bodyPr/>
+          <a:lstStyle/>
+          <a:p>
+            <a:r>
+              <a:rPr lang="es-MX" dirty="0"/>
+              <a:t>Función </a:t>
+            </a:r>
+            <a:r>
+              <a:rPr lang="es-MX" dirty="0" err="1">
+                <a:solidFill>
+                  <a:srgbClr val="0070C0"/>
+                </a:solidFill>
+                <a:latin typeface="Consolas" panose="020B0609020204030204" pitchFamily="49" charset="0"/>
+              </a:rPr>
+              <a:t>p</a:t>
+            </a:r>
+            <a:r>
+              <a:rPr lang="es-MX" dirty="0" err="1">
+                <a:solidFill>
+                  <a:schemeClr val="accent1"/>
+                </a:solidFill>
+                <a:latin typeface="Consolas" panose="020B0609020204030204" pitchFamily="49" charset="0"/>
+              </a:rPr>
+              <a:t>rin</a:t>
+            </a:r>
+            <a:r>
+              <a:rPr lang="es-MX" dirty="0" err="1">
+                <a:solidFill>
+                  <a:srgbClr val="0070C0"/>
+                </a:solidFill>
+                <a:latin typeface="Consolas" panose="020B0609020204030204" pitchFamily="49" charset="0"/>
+              </a:rPr>
+              <a:t>t</a:t>
+            </a:r>
+            <a:r>
+              <a:rPr lang="es-MX" dirty="0">
+                <a:latin typeface="Consolas" panose="020B0609020204030204" pitchFamily="49" charset="0"/>
+              </a:rPr>
+              <a:t>()</a:t>
+            </a:r>
+            <a:r>
+              <a:rPr lang="es-MX" dirty="0">
+                <a:solidFill>
+                  <a:srgbClr val="0070C0"/>
+                </a:solidFill>
+                <a:latin typeface="Consolas" panose="020B0609020204030204" pitchFamily="49" charset="0"/>
+              </a:rPr>
+              <a:t> </a:t>
             </a:r>
             <a:endParaRPr lang="es-MX" dirty="0"/>
-          </a:p>
-        </p:txBody>
-      </p:sp>
-      <p:sp>
-        <p:nvSpPr>
-          <p:cNvPr id="3" name="Subtítulo 2">
-            <a:extLst>
-              <a:ext uri="{FF2B5EF4-FFF2-40B4-BE49-F238E27FC236}">
-                <a16:creationId xmlns:a16="http://schemas.microsoft.com/office/drawing/2014/main" id="{98683B19-E409-4FC6-A641-4C9F636D32D5}"/>
-              </a:ext>
-            </a:extLst>
-          </p:cNvPr>
-          <p:cNvSpPr>
-            <a:spLocks noGrp="1"/>
-          </p:cNvSpPr>
-          <p:nvPr>
-            <p:ph type="subTitle" idx="1"/>
-          </p:nvPr>
-        </p:nvSpPr>
-        <p:spPr/>
-        <p:txBody>
-          <a:bodyPr/>
-          <a:lstStyle/>
-          <a:p>
-            <a:endParaRPr lang="es-MX"/>
           </a:p>
         </p:txBody>
       </p:sp>
     </p:spTree>
     <p:extLst>
       <p:ext uri="{BB962C8B-B14F-4D97-AF65-F5344CB8AC3E}">
-        <p14:creationId xmlns:p14="http://schemas.microsoft.com/office/powerpoint/2010/main" val="3172936338"/>
+        <p14:creationId xmlns:p14="http://schemas.microsoft.com/office/powerpoint/2010/main" val="526031103"/>
       </p:ext>
     </p:extLst>
   </p:cSld>
@@ -3540,6 +3587,173 @@
           <p:cNvPr id="2" name="Título 1">
             <a:extLst>
               <a:ext uri="{FF2B5EF4-FFF2-40B4-BE49-F238E27FC236}">
+                <a16:creationId xmlns:a16="http://schemas.microsoft.com/office/drawing/2014/main" id="{82CBEF54-2351-418B-9CAF-1547DCAC6B84}"/>
+              </a:ext>
+            </a:extLst>
+          </p:cNvPr>
+          <p:cNvSpPr>
+            <a:spLocks noGrp="1"/>
+          </p:cNvSpPr>
+          <p:nvPr>
+            <p:ph type="title"/>
+          </p:nvPr>
+        </p:nvSpPr>
+        <p:spPr/>
+        <p:txBody>
+          <a:bodyPr/>
+          <a:lstStyle/>
+          <a:p>
+            <a:r>
+              <a:rPr lang="es-MX" dirty="0"/>
+              <a:t>Ejercicio 07-03</a:t>
+            </a:r>
+          </a:p>
+        </p:txBody>
+      </p:sp>
+      <p:sp>
+        <p:nvSpPr>
+          <p:cNvPr id="3" name="Marcador de contenido 2">
+            <a:extLst>
+              <a:ext uri="{FF2B5EF4-FFF2-40B4-BE49-F238E27FC236}">
+                <a16:creationId xmlns:a16="http://schemas.microsoft.com/office/drawing/2014/main" id="{016E51AB-2545-4A19-BD04-589B753BB4F2}"/>
+              </a:ext>
+            </a:extLst>
+          </p:cNvPr>
+          <p:cNvSpPr>
+            <a:spLocks noGrp="1"/>
+          </p:cNvSpPr>
+          <p:nvPr>
+            <p:ph idx="1"/>
+          </p:nvPr>
+        </p:nvSpPr>
+        <p:spPr/>
+        <p:txBody>
+          <a:bodyPr/>
+          <a:lstStyle/>
+          <a:p>
+            <a:endParaRPr lang="es-MX"/>
+          </a:p>
+        </p:txBody>
+      </p:sp>
+    </p:spTree>
+    <p:extLst>
+      <p:ext uri="{BB962C8B-B14F-4D97-AF65-F5344CB8AC3E}">
+        <p14:creationId xmlns:p14="http://schemas.microsoft.com/office/powerpoint/2010/main" val="1558953747"/>
+      </p:ext>
+    </p:extLst>
+  </p:cSld>
+  <p:clrMapOvr>
+    <a:masterClrMapping/>
+  </p:clrMapOvr>
+</p:sld>
+</file>
+
+<file path=ppt/slides/slide12.xml><?xml version="1.0" encoding="utf-8"?>
+<p:sld xmlns:a="http://schemas.openxmlformats.org/drawingml/2006/main" xmlns:r="http://schemas.openxmlformats.org/officeDocument/2006/relationships" xmlns:p="http://schemas.openxmlformats.org/presentationml/2006/main">
+  <p:cSld>
+    <p:spTree>
+      <p:nvGrpSpPr>
+        <p:cNvPr id="1" name=""/>
+        <p:cNvGrpSpPr/>
+        <p:nvPr/>
+      </p:nvGrpSpPr>
+      <p:grpSpPr>
+        <a:xfrm>
+          <a:off x="0" y="0"/>
+          <a:ext cx="0" cy="0"/>
+          <a:chOff x="0" y="0"/>
+          <a:chExt cx="0" cy="0"/>
+        </a:xfrm>
+      </p:grpSpPr>
+      <p:sp>
+        <p:nvSpPr>
+          <p:cNvPr id="2" name="Título 1">
+            <a:extLst>
+              <a:ext uri="{FF2B5EF4-FFF2-40B4-BE49-F238E27FC236}">
+                <a16:creationId xmlns:a16="http://schemas.microsoft.com/office/drawing/2014/main" id="{3A164C3F-57DB-4AF4-9798-390DF52ECD56}"/>
+              </a:ext>
+            </a:extLst>
+          </p:cNvPr>
+          <p:cNvSpPr>
+            <a:spLocks noGrp="1"/>
+          </p:cNvSpPr>
+          <p:nvPr>
+            <p:ph type="ctrTitle"/>
+          </p:nvPr>
+        </p:nvSpPr>
+        <p:spPr/>
+        <p:txBody>
+          <a:bodyPr/>
+          <a:lstStyle/>
+          <a:p>
+            <a:r>
+              <a:rPr lang="es-MX" dirty="0" err="1"/>
+              <a:t>IPython</a:t>
+            </a:r>
+            <a:endParaRPr lang="es-MX" dirty="0"/>
+          </a:p>
+        </p:txBody>
+      </p:sp>
+      <p:sp>
+        <p:nvSpPr>
+          <p:cNvPr id="3" name="Subtítulo 2">
+            <a:extLst>
+              <a:ext uri="{FF2B5EF4-FFF2-40B4-BE49-F238E27FC236}">
+                <a16:creationId xmlns:a16="http://schemas.microsoft.com/office/drawing/2014/main" id="{98683B19-E409-4FC6-A641-4C9F636D32D5}"/>
+              </a:ext>
+            </a:extLst>
+          </p:cNvPr>
+          <p:cNvSpPr>
+            <a:spLocks noGrp="1"/>
+          </p:cNvSpPr>
+          <p:nvPr>
+            <p:ph type="subTitle" idx="1"/>
+          </p:nvPr>
+        </p:nvSpPr>
+        <p:spPr/>
+        <p:txBody>
+          <a:bodyPr/>
+          <a:lstStyle/>
+          <a:p>
+            <a:endParaRPr lang="es-MX"/>
+          </a:p>
+        </p:txBody>
+      </p:sp>
+    </p:spTree>
+    <p:extLst>
+      <p:ext uri="{BB962C8B-B14F-4D97-AF65-F5344CB8AC3E}">
+        <p14:creationId xmlns:p14="http://schemas.microsoft.com/office/powerpoint/2010/main" val="3172936338"/>
+      </p:ext>
+    </p:extLst>
+  </p:cSld>
+  <p:clrMapOvr>
+    <a:masterClrMapping/>
+  </p:clrMapOvr>
+</p:sld>
+</file>
+
+<file path=ppt/slides/slide13.xml><?xml version="1.0" encoding="utf-8"?>
+<p:sld xmlns:a="http://schemas.openxmlformats.org/drawingml/2006/main" xmlns:r="http://schemas.openxmlformats.org/officeDocument/2006/relationships" xmlns:p="http://schemas.openxmlformats.org/presentationml/2006/main">
+  <p:cSld>
+    <p:spTree>
+      <p:nvGrpSpPr>
+        <p:cNvPr id="1" name=""/>
+        <p:cNvGrpSpPr/>
+        <p:nvPr/>
+      </p:nvGrpSpPr>
+      <p:grpSpPr>
+        <a:xfrm>
+          <a:off x="0" y="0"/>
+          <a:ext cx="0" cy="0"/>
+          <a:chOff x="0" y="0"/>
+          <a:chExt cx="0" cy="0"/>
+        </a:xfrm>
+      </p:grpSpPr>
+      <p:sp>
+        <p:nvSpPr>
+          <p:cNvPr id="2" name="Título 1">
+            <a:extLst>
+              <a:ext uri="{FF2B5EF4-FFF2-40B4-BE49-F238E27FC236}">
                 <a16:creationId xmlns:a16="http://schemas.microsoft.com/office/drawing/2014/main" id="{BFC9A799-5245-4892-BBE1-4336E8097B1F}"/>
               </a:ext>
             </a:extLst>
@@ -3637,7 +3851,7 @@
 </p:sld>
 </file>
 
-<file path=ppt/slides/slide12.xml><?xml version="1.0" encoding="utf-8"?>
+<file path=ppt/slides/slide14.xml><?xml version="1.0" encoding="utf-8"?>
 <p:sld xmlns:a="http://schemas.openxmlformats.org/drawingml/2006/main" xmlns:r="http://schemas.openxmlformats.org/officeDocument/2006/relationships" xmlns:p="http://schemas.openxmlformats.org/presentationml/2006/main">
   <p:cSld>
     <p:bg>
@@ -3972,261 +4186,6 @@
 </p:sld>
 </file>
 
-<file path=ppt/slides/slide13.xml><?xml version="1.0" encoding="utf-8"?>
-<p:sld xmlns:a="http://schemas.openxmlformats.org/drawingml/2006/main" xmlns:r="http://schemas.openxmlformats.org/officeDocument/2006/relationships" xmlns:p="http://schemas.openxmlformats.org/presentationml/2006/main">
-  <p:cSld>
-    <p:spTree>
-      <p:nvGrpSpPr>
-        <p:cNvPr id="1" name=""/>
-        <p:cNvGrpSpPr/>
-        <p:nvPr/>
-      </p:nvGrpSpPr>
-      <p:grpSpPr>
-        <a:xfrm>
-          <a:off x="0" y="0"/>
-          <a:ext cx="0" cy="0"/>
-          <a:chOff x="0" y="0"/>
-          <a:chExt cx="0" cy="0"/>
-        </a:xfrm>
-      </p:grpSpPr>
-      <p:sp>
-        <p:nvSpPr>
-          <p:cNvPr id="2" name="Título 1">
-            <a:extLst>
-              <a:ext uri="{FF2B5EF4-FFF2-40B4-BE49-F238E27FC236}">
-                <a16:creationId xmlns:a16="http://schemas.microsoft.com/office/drawing/2014/main" id="{77D970AB-7F23-45C3-A46E-D933F8B3ED6D}"/>
-              </a:ext>
-            </a:extLst>
-          </p:cNvPr>
-          <p:cNvSpPr>
-            <a:spLocks noGrp="1"/>
-          </p:cNvSpPr>
-          <p:nvPr>
-            <p:ph type="title"/>
-          </p:nvPr>
-        </p:nvSpPr>
-        <p:spPr/>
-        <p:txBody>
-          <a:bodyPr/>
-          <a:lstStyle/>
-          <a:p>
-            <a:r>
-              <a:rPr lang="es-MX" dirty="0" err="1"/>
-              <a:t>Jupyter</a:t>
-            </a:r>
-            <a:endParaRPr lang="es-MX" dirty="0"/>
-          </a:p>
-        </p:txBody>
-      </p:sp>
-      <p:sp>
-        <p:nvSpPr>
-          <p:cNvPr id="3" name="Marcador de contenido 2">
-            <a:extLst>
-              <a:ext uri="{FF2B5EF4-FFF2-40B4-BE49-F238E27FC236}">
-                <a16:creationId xmlns:a16="http://schemas.microsoft.com/office/drawing/2014/main" id="{97756364-9A3A-4BF1-AB99-A45A92E1D11C}"/>
-              </a:ext>
-            </a:extLst>
-          </p:cNvPr>
-          <p:cNvSpPr>
-            <a:spLocks noGrp="1"/>
-          </p:cNvSpPr>
-          <p:nvPr>
-            <p:ph idx="1"/>
-          </p:nvPr>
-        </p:nvSpPr>
-        <p:spPr/>
-        <p:txBody>
-          <a:bodyPr/>
-          <a:lstStyle/>
-          <a:p>
-            <a:r>
-              <a:rPr lang="es-MX" dirty="0"/>
-              <a:t>El proyecto de </a:t>
-            </a:r>
-            <a:r>
-              <a:rPr lang="es-MX" dirty="0" err="1"/>
-              <a:t>IPython</a:t>
-            </a:r>
-            <a:r>
-              <a:rPr lang="es-MX" dirty="0"/>
-              <a:t> creció, pasando por una consola con salida “rica” </a:t>
-            </a:r>
-            <a:r>
-              <a:rPr lang="es-MX" dirty="0" err="1"/>
-              <a:t>Ipython</a:t>
-            </a:r>
-            <a:r>
-              <a:rPr lang="es-MX" dirty="0"/>
-              <a:t> </a:t>
-            </a:r>
-            <a:r>
-              <a:rPr lang="es-MX" dirty="0" err="1"/>
-              <a:t>Qtconsole</a:t>
-            </a:r>
-            <a:r>
-              <a:rPr lang="es-MX" dirty="0"/>
-              <a:t>, hasta los Notebooks</a:t>
-            </a:r>
-          </a:p>
-          <a:p>
-            <a:r>
-              <a:rPr lang="es-MX" dirty="0"/>
-              <a:t>Los </a:t>
-            </a:r>
-            <a:r>
-              <a:rPr lang="es-MX" dirty="0" err="1"/>
-              <a:t>Jupyter</a:t>
-            </a:r>
-            <a:r>
-              <a:rPr lang="es-MX" dirty="0"/>
-              <a:t> Notebooks son la herramienta por defecto en la ciencia de datos y cómputo científico modernos</a:t>
-            </a:r>
-          </a:p>
-          <a:p>
-            <a:r>
-              <a:rPr lang="es-MX" dirty="0"/>
-              <a:t>Tiene una simbología muy bonita de ciencia abierta y reproducible </a:t>
-            </a:r>
-          </a:p>
-        </p:txBody>
-      </p:sp>
-    </p:spTree>
-    <p:extLst>
-      <p:ext uri="{BB962C8B-B14F-4D97-AF65-F5344CB8AC3E}">
-        <p14:creationId xmlns:p14="http://schemas.microsoft.com/office/powerpoint/2010/main" val="909284072"/>
-      </p:ext>
-    </p:extLst>
-  </p:cSld>
-  <p:clrMapOvr>
-    <a:masterClrMapping/>
-  </p:clrMapOvr>
-</p:sld>
-</file>
-
-<file path=ppt/slides/slide14.xml><?xml version="1.0" encoding="utf-8"?>
-<p:sld xmlns:a="http://schemas.openxmlformats.org/drawingml/2006/main" xmlns:r="http://schemas.openxmlformats.org/officeDocument/2006/relationships" xmlns:p="http://schemas.openxmlformats.org/presentationml/2006/main">
-  <p:cSld>
-    <p:spTree>
-      <p:nvGrpSpPr>
-        <p:cNvPr id="1" name=""/>
-        <p:cNvGrpSpPr/>
-        <p:nvPr/>
-      </p:nvGrpSpPr>
-      <p:grpSpPr>
-        <a:xfrm>
-          <a:off x="0" y="0"/>
-          <a:ext cx="0" cy="0"/>
-          <a:chOff x="0" y="0"/>
-          <a:chExt cx="0" cy="0"/>
-        </a:xfrm>
-      </p:grpSpPr>
-      <p:sp>
-        <p:nvSpPr>
-          <p:cNvPr id="2" name="Título 1">
-            <a:extLst>
-              <a:ext uri="{FF2B5EF4-FFF2-40B4-BE49-F238E27FC236}">
-                <a16:creationId xmlns:a16="http://schemas.microsoft.com/office/drawing/2014/main" id="{5BD9FD13-1947-49E4-8DCF-415213D89BEF}"/>
-              </a:ext>
-            </a:extLst>
-          </p:cNvPr>
-          <p:cNvSpPr>
-            <a:spLocks noGrp="1"/>
-          </p:cNvSpPr>
-          <p:nvPr>
-            <p:ph type="title"/>
-          </p:nvPr>
-        </p:nvSpPr>
-        <p:spPr/>
-        <p:txBody>
-          <a:bodyPr/>
-          <a:lstStyle/>
-          <a:p>
-            <a:r>
-              <a:rPr lang="es-MX" dirty="0" err="1"/>
-              <a:t>Jupyter</a:t>
-            </a:r>
-            <a:r>
-              <a:rPr lang="es-MX" dirty="0"/>
-              <a:t> Notebooks</a:t>
-            </a:r>
-          </a:p>
-        </p:txBody>
-      </p:sp>
-      <p:sp>
-        <p:nvSpPr>
-          <p:cNvPr id="3" name="Marcador de contenido 2">
-            <a:extLst>
-              <a:ext uri="{FF2B5EF4-FFF2-40B4-BE49-F238E27FC236}">
-                <a16:creationId xmlns:a16="http://schemas.microsoft.com/office/drawing/2014/main" id="{12B9FED1-2E1A-4EF8-AE25-465D75281097}"/>
-              </a:ext>
-            </a:extLst>
-          </p:cNvPr>
-          <p:cNvSpPr>
-            <a:spLocks noGrp="1"/>
-          </p:cNvSpPr>
-          <p:nvPr>
-            <p:ph idx="1"/>
-          </p:nvPr>
-        </p:nvSpPr>
-        <p:spPr/>
-        <p:txBody>
-          <a:bodyPr/>
-          <a:lstStyle/>
-          <a:p>
-            <a:r>
-              <a:rPr lang="es-MX" dirty="0"/>
-              <a:t>Los Notebooks son archivos (.</a:t>
-            </a:r>
-            <a:r>
-              <a:rPr lang="es-MX" dirty="0" err="1"/>
-              <a:t>ipynb</a:t>
-            </a:r>
-            <a:r>
-              <a:rPr lang="es-MX" dirty="0"/>
-              <a:t>) que permiten tener en el mismo documento texto (con </a:t>
-            </a:r>
-            <a:r>
-              <a:rPr lang="es-MX" dirty="0" err="1"/>
-              <a:t>Markdown</a:t>
-            </a:r>
-            <a:r>
-              <a:rPr lang="es-MX" dirty="0"/>
-              <a:t>) con ecuaciones (LaTeX), código e imágenes.</a:t>
-            </a:r>
-          </a:p>
-          <a:p>
-            <a:r>
-              <a:rPr lang="es-MX" dirty="0"/>
-              <a:t>La idea es poder compartir ciencia en este formato que permita reproducir resultados.</a:t>
-            </a:r>
-          </a:p>
-          <a:p>
-            <a:r>
-              <a:rPr lang="es-MX" dirty="0"/>
-              <a:t>Actualmente, soporta una variedad enorme de lenguajes, por lo que es “agnóstico” al lenguaje de programación.</a:t>
-            </a:r>
-          </a:p>
-          <a:p>
-            <a:r>
-              <a:rPr lang="es-MX" dirty="0"/>
-              <a:t>De hecho, el mismo nombre refleja lo anterior</a:t>
-            </a:r>
-          </a:p>
-        </p:txBody>
-      </p:sp>
-    </p:spTree>
-    <p:extLst>
-      <p:ext uri="{BB962C8B-B14F-4D97-AF65-F5344CB8AC3E}">
-        <p14:creationId xmlns:p14="http://schemas.microsoft.com/office/powerpoint/2010/main" val="2089937728"/>
-      </p:ext>
-    </p:extLst>
-  </p:cSld>
-  <p:clrMapOvr>
-    <a:masterClrMapping/>
-  </p:clrMapOvr>
-</p:sld>
-</file>
-
 <file path=ppt/slides/slide15.xml><?xml version="1.0" encoding="utf-8"?>
 <p:sld xmlns:a="http://schemas.openxmlformats.org/drawingml/2006/main" xmlns:r="http://schemas.openxmlformats.org/officeDocument/2006/relationships" xmlns:p="http://schemas.openxmlformats.org/presentationml/2006/main">
   <p:cSld>
@@ -4249,7 +4208,7 @@
           <p:cNvPr id="2" name="Título 1">
             <a:extLst>
               <a:ext uri="{FF2B5EF4-FFF2-40B4-BE49-F238E27FC236}">
-                <a16:creationId xmlns:a16="http://schemas.microsoft.com/office/drawing/2014/main" id="{392EBA50-068A-4075-AAEC-4E7F8E0137F0}"/>
+                <a16:creationId xmlns:a16="http://schemas.microsoft.com/office/drawing/2014/main" id="{77D970AB-7F23-45C3-A46E-D933F8B3ED6D}"/>
               </a:ext>
             </a:extLst>
           </p:cNvPr>
@@ -4273,136 +4232,82 @@
           </a:p>
         </p:txBody>
       </p:sp>
-      <p:pic>
-        <p:nvPicPr>
-          <p:cNvPr id="7" name="Gráfico 6">
-            <a:extLst>
-              <a:ext uri="{FF2B5EF4-FFF2-40B4-BE49-F238E27FC236}">
-                <a16:creationId xmlns:a16="http://schemas.microsoft.com/office/drawing/2014/main" id="{47B8124F-67E1-43A2-ACFF-3DF31690109C}"/>
-              </a:ext>
-            </a:extLst>
-          </p:cNvPr>
-          <p:cNvPicPr>
-            <a:picLocks noChangeAspect="1"/>
-          </p:cNvPicPr>
-          <p:nvPr/>
-        </p:nvPicPr>
-        <p:blipFill>
-          <a:blip r:embed="rId2">
-            <a:extLst>
-              <a:ext uri="{28A0092B-C50C-407E-A947-70E740481C1C}">
-                <a14:useLocalDpi xmlns:a14="http://schemas.microsoft.com/office/drawing/2010/main" val="0"/>
-              </a:ext>
-              <a:ext uri="{96DAC541-7B7A-43D3-8B79-37D633B846F1}">
-                <asvg:svgBlip xmlns:asvg="http://schemas.microsoft.com/office/drawing/2016/SVG/main" r:embed="rId3"/>
-              </a:ext>
-            </a:extLst>
-          </a:blip>
-          <a:stretch>
-            <a:fillRect/>
-          </a:stretch>
-        </p:blipFill>
-        <p:spPr>
-          <a:xfrm>
-            <a:off x="1089163" y="1855004"/>
-            <a:ext cx="2939497" cy="3407145"/>
-          </a:xfrm>
-          <a:prstGeom prst="rect">
-            <a:avLst/>
-          </a:prstGeom>
-        </p:spPr>
-      </p:pic>
-      <p:sp>
-        <p:nvSpPr>
-          <p:cNvPr id="8" name="CuadroTexto 7">
-            <a:extLst>
-              <a:ext uri="{FF2B5EF4-FFF2-40B4-BE49-F238E27FC236}">
-                <a16:creationId xmlns:a16="http://schemas.microsoft.com/office/drawing/2014/main" id="{0A8FC7C3-F8FD-43FA-91F5-B2AB0993D33E}"/>
-              </a:ext>
-            </a:extLst>
-          </p:cNvPr>
-          <p:cNvSpPr txBox="1"/>
-          <p:nvPr/>
-        </p:nvSpPr>
-        <p:spPr>
-          <a:xfrm>
-            <a:off x="4432041" y="1470991"/>
-            <a:ext cx="7147249" cy="3077766"/>
-          </a:xfrm>
-          <a:prstGeom prst="rect">
-            <a:avLst/>
-          </a:prstGeom>
-          <a:noFill/>
-        </p:spPr>
-        <p:txBody>
-          <a:bodyPr wrap="square" rtlCol="0">
-            <a:spAutoFit/>
-          </a:bodyPr>
-          <a:lstStyle/>
-          <a:p>
-            <a:pPr marL="571500" indent="-571500">
-              <a:buFont typeface="Arial" panose="020B0604020202020204" pitchFamily="34" charset="0"/>
-              <a:buChar char="•"/>
-            </a:pPr>
-            <a:r>
-              <a:rPr lang="es-MX" sz="4400" dirty="0">
-                <a:latin typeface="Century Gothic" panose="020B0502020202020204" pitchFamily="34" charset="0"/>
-                <a:ea typeface="+mj-ea"/>
-                <a:cs typeface="+mj-cs"/>
-              </a:rPr>
-              <a:t>Open-</a:t>
-            </a:r>
-            <a:r>
-              <a:rPr lang="es-MX" sz="4400" dirty="0" err="1">
-                <a:latin typeface="Century Gothic" panose="020B0502020202020204" pitchFamily="34" charset="0"/>
-                <a:ea typeface="+mj-ea"/>
-                <a:cs typeface="+mj-cs"/>
-              </a:rPr>
-              <a:t>source</a:t>
-            </a:r>
-            <a:endParaRPr lang="es-MX" sz="4400" dirty="0">
-              <a:latin typeface="Century Gothic" panose="020B0502020202020204" pitchFamily="34" charset="0"/>
-              <a:ea typeface="+mj-ea"/>
-              <a:cs typeface="+mj-cs"/>
-            </a:endParaRPr>
-          </a:p>
-          <a:p>
-            <a:pPr marL="571500" indent="-571500">
-              <a:buFont typeface="Arial" panose="020B0604020202020204" pitchFamily="34" charset="0"/>
-              <a:buChar char="•"/>
-            </a:pPr>
-            <a:r>
-              <a:rPr lang="es-MX" sz="4400" dirty="0">
-                <a:latin typeface="Century Gothic" panose="020B0502020202020204" pitchFamily="34" charset="0"/>
-                <a:ea typeface="+mj-ea"/>
-                <a:cs typeface="+mj-cs"/>
-              </a:rPr>
-              <a:t>Gratis</a:t>
-            </a:r>
-          </a:p>
-          <a:p>
-            <a:pPr marL="571500" indent="-571500">
-              <a:buFont typeface="Arial" panose="020B0604020202020204" pitchFamily="34" charset="0"/>
-              <a:buChar char="•"/>
-            </a:pPr>
-            <a:r>
-              <a:rPr lang="es-MX" sz="4400" dirty="0">
-                <a:latin typeface="Century Gothic" panose="020B0502020202020204" pitchFamily="34" charset="0"/>
-                <a:ea typeface="+mj-ea"/>
-                <a:cs typeface="+mj-cs"/>
-              </a:rPr>
-              <a:t>Licencia BSD modificada</a:t>
-            </a:r>
-          </a:p>
-          <a:p>
-            <a:endParaRPr lang="es-MX" dirty="0"/>
+      <p:sp>
+        <p:nvSpPr>
+          <p:cNvPr id="3" name="Marcador de contenido 2">
+            <a:extLst>
+              <a:ext uri="{FF2B5EF4-FFF2-40B4-BE49-F238E27FC236}">
+                <a16:creationId xmlns:a16="http://schemas.microsoft.com/office/drawing/2014/main" id="{97756364-9A3A-4BF1-AB99-A45A92E1D11C}"/>
+              </a:ext>
+            </a:extLst>
+          </p:cNvPr>
+          <p:cNvSpPr>
+            <a:spLocks noGrp="1"/>
+          </p:cNvSpPr>
+          <p:nvPr>
+            <p:ph idx="1"/>
+          </p:nvPr>
+        </p:nvSpPr>
+        <p:spPr/>
+        <p:txBody>
+          <a:bodyPr/>
+          <a:lstStyle/>
+          <a:p>
+            <a:r>
+              <a:rPr lang="es-MX" dirty="0"/>
+              <a:t>El proyecto de </a:t>
+            </a:r>
+            <a:r>
+              <a:rPr lang="es-MX" dirty="0" err="1"/>
+              <a:t>IPython</a:t>
+            </a:r>
+            <a:r>
+              <a:rPr lang="es-MX" dirty="0"/>
+              <a:t> creció, pasando por una consola con salida “rica” </a:t>
+            </a:r>
+            <a:r>
+              <a:rPr lang="es-MX" dirty="0" err="1"/>
+              <a:t>Ipython</a:t>
+            </a:r>
+            <a:r>
+              <a:rPr lang="es-MX" dirty="0"/>
+              <a:t> </a:t>
+            </a:r>
+            <a:r>
+              <a:rPr lang="es-MX" dirty="0" err="1"/>
+              <a:t>Qtconsole</a:t>
+            </a:r>
+            <a:r>
+              <a:rPr lang="es-MX" dirty="0"/>
+              <a:t>, hasta los Notebooks</a:t>
+            </a:r>
+          </a:p>
+          <a:p>
+            <a:r>
+              <a:rPr lang="es-MX" dirty="0"/>
+              <a:t>Los </a:t>
+            </a:r>
+            <a:r>
+              <a:rPr lang="es-MX" dirty="0" err="1"/>
+              <a:t>Jupyter</a:t>
+            </a:r>
+            <a:r>
+              <a:rPr lang="es-MX" dirty="0"/>
+              <a:t> Notebooks son la herramienta por defecto en la ciencia de datos y cómputo científico modernos</a:t>
+            </a:r>
+          </a:p>
+          <a:p>
+            <a:r>
+              <a:rPr lang="es-MX" dirty="0"/>
+              <a:t>Tiene una simbología muy bonita de ciencia abierta y reproducible </a:t>
+            </a:r>
           </a:p>
         </p:txBody>
       </p:sp>
     </p:spTree>
     <p:extLst>
       <p:ext uri="{BB962C8B-B14F-4D97-AF65-F5344CB8AC3E}">
-        <p14:creationId xmlns:p14="http://schemas.microsoft.com/office/powerpoint/2010/main" val="3042834177"/>
+        <p14:creationId xmlns:p14="http://schemas.microsoft.com/office/powerpoint/2010/main" val="909284072"/>
       </p:ext>
     </p:extLst>
   </p:cSld>
@@ -4434,7 +4339,7 @@
           <p:cNvPr id="2" name="Título 1">
             <a:extLst>
               <a:ext uri="{FF2B5EF4-FFF2-40B4-BE49-F238E27FC236}">
-                <a16:creationId xmlns:a16="http://schemas.microsoft.com/office/drawing/2014/main" id="{E51F1EA5-40BA-4F87-A38B-3A8693F731B2}"/>
+                <a16:creationId xmlns:a16="http://schemas.microsoft.com/office/drawing/2014/main" id="{5BD9FD13-1947-49E4-8DCF-415213D89BEF}"/>
               </a:ext>
             </a:extLst>
           </p:cNvPr>
@@ -4443,34 +4348,6 @@
           </p:cNvSpPr>
           <p:nvPr>
             <p:ph type="title"/>
-          </p:nvPr>
-        </p:nvSpPr>
-        <p:spPr/>
-        <p:txBody>
-          <a:bodyPr/>
-          <a:lstStyle/>
-          <a:p>
-            <a:r>
-              <a:rPr lang="es-MX" dirty="0"/>
-              <a:t>Diferentes interfaces</a:t>
-            </a:r>
-          </a:p>
-        </p:txBody>
-      </p:sp>
-      <p:sp>
-        <p:nvSpPr>
-          <p:cNvPr id="3" name="Marcador de contenido 2">
-            <a:extLst>
-              <a:ext uri="{FF2B5EF4-FFF2-40B4-BE49-F238E27FC236}">
-                <a16:creationId xmlns:a16="http://schemas.microsoft.com/office/drawing/2014/main" id="{87D98826-A1BA-43A1-BB89-F6C053DE29C7}"/>
-              </a:ext>
-            </a:extLst>
-          </p:cNvPr>
-          <p:cNvSpPr>
-            <a:spLocks noGrp="1"/>
-          </p:cNvSpPr>
-          <p:nvPr>
-            <p:ph idx="1"/>
           </p:nvPr>
         </p:nvSpPr>
         <p:spPr/>
@@ -4484,56 +4361,77 @@
             </a:r>
             <a:r>
               <a:rPr lang="es-MX" dirty="0"/>
-              <a:t> </a:t>
+              <a:t> Notebooks</a:t>
+            </a:r>
+          </a:p>
+        </p:txBody>
+      </p:sp>
+      <p:sp>
+        <p:nvSpPr>
+          <p:cNvPr id="3" name="Marcador de contenido 2">
+            <a:extLst>
+              <a:ext uri="{FF2B5EF4-FFF2-40B4-BE49-F238E27FC236}">
+                <a16:creationId xmlns:a16="http://schemas.microsoft.com/office/drawing/2014/main" id="{12B9FED1-2E1A-4EF8-AE25-465D75281097}"/>
+              </a:ext>
+            </a:extLst>
+          </p:cNvPr>
+          <p:cNvSpPr>
+            <a:spLocks noGrp="1"/>
+          </p:cNvSpPr>
+          <p:nvPr>
+            <p:ph idx="1"/>
+          </p:nvPr>
+        </p:nvSpPr>
+        <p:spPr/>
+        <p:txBody>
+          <a:bodyPr/>
+          <a:lstStyle/>
+          <a:p>
+            <a:r>
+              <a:rPr lang="es-MX" dirty="0"/>
+              <a:t>Los Notebooks son archivos (.</a:t>
             </a:r>
             <a:r>
               <a:rPr lang="es-MX" dirty="0" err="1"/>
-              <a:t>lab</a:t>
-            </a:r>
-            <a:endParaRPr lang="es-MX" dirty="0"/>
-          </a:p>
-          <a:p>
+              <a:t>ipynb</a:t>
+            </a:r>
+            <a:r>
+              <a:rPr lang="es-MX" dirty="0"/>
+              <a:t>) que permiten tener en el mismo documento texto (con </a:t>
+            </a:r>
             <a:r>
               <a:rPr lang="es-MX" dirty="0" err="1"/>
-              <a:t>Jupyter</a:t>
+              <a:t>Markdown</a:t>
             </a:r>
             <a:r>
               <a:rPr lang="es-MX" dirty="0"/>
-              <a:t> </a:t>
-            </a:r>
-            <a:r>
-              <a:rPr lang="es-MX" dirty="0" err="1"/>
-              <a:t>console</a:t>
-            </a:r>
-            <a:endParaRPr lang="es-MX" dirty="0"/>
-          </a:p>
-          <a:p>
-            <a:r>
-              <a:rPr lang="es-MX" dirty="0" err="1"/>
-              <a:t>Jupyter</a:t>
-            </a:r>
+              <a:t>) con ecuaciones (LaTeX), código e imágenes.</a:t>
+            </a:r>
+          </a:p>
+          <a:p>
             <a:r>
               <a:rPr lang="es-MX" dirty="0"/>
-              <a:t> notebook</a:t>
+              <a:t>La idea es poder compartir ciencia en este formato que permita reproducir resultados.</a:t>
             </a:r>
           </a:p>
           <a:p>
             <a:r>
               <a:rPr lang="es-MX" dirty="0"/>
-              <a:t>Qt </a:t>
-            </a:r>
-            <a:r>
-              <a:rPr lang="es-MX" dirty="0" err="1"/>
-              <a:t>console</a:t>
-            </a:r>
-            <a:endParaRPr lang="es-MX" dirty="0"/>
+              <a:t>Actualmente, soporta una variedad enorme de lenguajes, por lo que es “agnóstico” al lenguaje de programación.</a:t>
+            </a:r>
+          </a:p>
+          <a:p>
+            <a:r>
+              <a:rPr lang="es-MX" dirty="0"/>
+              <a:t>De hecho, el mismo nombre refleja lo anterior</a:t>
+            </a:r>
           </a:p>
         </p:txBody>
       </p:sp>
     </p:spTree>
     <p:extLst>
       <p:ext uri="{BB962C8B-B14F-4D97-AF65-F5344CB8AC3E}">
-        <p14:creationId xmlns:p14="http://schemas.microsoft.com/office/powerpoint/2010/main" val="308431836"/>
+        <p14:creationId xmlns:p14="http://schemas.microsoft.com/office/powerpoint/2010/main" val="2089937728"/>
       </p:ext>
     </p:extLst>
   </p:cSld>
@@ -4565,7 +4463,7 @@
           <p:cNvPr id="2" name="Título 1">
             <a:extLst>
               <a:ext uri="{FF2B5EF4-FFF2-40B4-BE49-F238E27FC236}">
-                <a16:creationId xmlns:a16="http://schemas.microsoft.com/office/drawing/2014/main" id="{04212476-3383-4E23-ADF2-304C91030E4F}"/>
+                <a16:creationId xmlns:a16="http://schemas.microsoft.com/office/drawing/2014/main" id="{392EBA50-068A-4075-AAEC-4E7F8E0137F0}"/>
               </a:ext>
             </a:extLst>
           </p:cNvPr>
@@ -4582,86 +4480,143 @@
           <a:lstStyle/>
           <a:p>
             <a:r>
-              <a:rPr lang="es-MX" dirty="0"/>
-              <a:t>Diferentes </a:t>
-            </a:r>
-            <a:r>
-              <a:rPr lang="es-MX" i="1" dirty="0" err="1"/>
-              <a:t>kernels</a:t>
-            </a:r>
-            <a:endParaRPr lang="es-MX" i="1" dirty="0"/>
-          </a:p>
-        </p:txBody>
-      </p:sp>
-      <p:sp>
-        <p:nvSpPr>
-          <p:cNvPr id="3" name="Marcador de contenido 2">
-            <a:extLst>
-              <a:ext uri="{FF2B5EF4-FFF2-40B4-BE49-F238E27FC236}">
-                <a16:creationId xmlns:a16="http://schemas.microsoft.com/office/drawing/2014/main" id="{BA4CEFD1-9CA5-4D71-9BF4-D7C7467B1CB6}"/>
-              </a:ext>
-            </a:extLst>
-          </p:cNvPr>
-          <p:cNvSpPr>
-            <a:spLocks noGrp="1"/>
-          </p:cNvSpPr>
-          <p:nvPr>
-            <p:ph idx="1"/>
-          </p:nvPr>
-        </p:nvSpPr>
-        <p:spPr/>
-        <p:txBody>
-          <a:bodyPr/>
-          <a:lstStyle/>
-          <a:p>
-            <a:r>
-              <a:rPr lang="es-MX" dirty="0"/>
-              <a:t>Oficiales</a:t>
-            </a:r>
-          </a:p>
-          <a:p>
-            <a:pPr lvl="1"/>
-            <a:r>
               <a:rPr lang="es-MX" dirty="0" err="1"/>
-              <a:t>IPython</a:t>
+              <a:t>Jupyter</a:t>
             </a:r>
             <a:endParaRPr lang="es-MX" dirty="0"/>
           </a:p>
-          <a:p>
-            <a:pPr lvl="1"/>
-            <a:r>
-              <a:rPr lang="es-MX" dirty="0" err="1"/>
-              <a:t>IRkernel</a:t>
-            </a:r>
+        </p:txBody>
+      </p:sp>
+      <p:pic>
+        <p:nvPicPr>
+          <p:cNvPr id="7" name="Gráfico 6">
+            <a:extLst>
+              <a:ext uri="{FF2B5EF4-FFF2-40B4-BE49-F238E27FC236}">
+                <a16:creationId xmlns:a16="http://schemas.microsoft.com/office/drawing/2014/main" id="{47B8124F-67E1-43A2-ACFF-3DF31690109C}"/>
+              </a:ext>
+            </a:extLst>
+          </p:cNvPr>
+          <p:cNvPicPr>
+            <a:picLocks noChangeAspect="1"/>
+          </p:cNvPicPr>
+          <p:nvPr/>
+        </p:nvPicPr>
+        <p:blipFill>
+          <a:blip r:embed="rId2">
+            <a:extLst>
+              <a:ext uri="{28A0092B-C50C-407E-A947-70E740481C1C}">
+                <a14:useLocalDpi xmlns:a14="http://schemas.microsoft.com/office/drawing/2010/main" val="0"/>
+              </a:ext>
+              <a:ext uri="{96DAC541-7B7A-43D3-8B79-37D633B846F1}">
+                <asvg:svgBlip xmlns:asvg="http://schemas.microsoft.com/office/drawing/2016/SVG/main" r:embed="rId3"/>
+              </a:ext>
+            </a:extLst>
+          </a:blip>
+          <a:stretch>
+            <a:fillRect/>
+          </a:stretch>
+        </p:blipFill>
+        <p:spPr>
+          <a:xfrm>
+            <a:off x="1089163" y="1855004"/>
+            <a:ext cx="2939497" cy="3407145"/>
+          </a:xfrm>
+          <a:prstGeom prst="rect">
+            <a:avLst/>
+          </a:prstGeom>
+        </p:spPr>
+      </p:pic>
+      <p:sp>
+        <p:nvSpPr>
+          <p:cNvPr id="8" name="CuadroTexto 7">
+            <a:extLst>
+              <a:ext uri="{FF2B5EF4-FFF2-40B4-BE49-F238E27FC236}">
+                <a16:creationId xmlns:a16="http://schemas.microsoft.com/office/drawing/2014/main" id="{0A8FC7C3-F8FD-43FA-91F5-B2AB0993D33E}"/>
+              </a:ext>
+            </a:extLst>
+          </p:cNvPr>
+          <p:cNvSpPr txBox="1"/>
+          <p:nvPr/>
+        </p:nvSpPr>
+        <p:spPr>
+          <a:xfrm>
+            <a:off x="4432041" y="1470991"/>
+            <a:ext cx="7147249" cy="3077766"/>
+          </a:xfrm>
+          <a:prstGeom prst="rect">
+            <a:avLst/>
+          </a:prstGeom>
+          <a:noFill/>
+        </p:spPr>
+        <p:txBody>
+          <a:bodyPr wrap="square" rtlCol="0">
+            <a:spAutoFit/>
+          </a:bodyPr>
+          <a:lstStyle/>
+          <a:p>
+            <a:pPr marL="571500" indent="-571500">
+              <a:buFont typeface="Arial" panose="020B0604020202020204" pitchFamily="34" charset="0"/>
+              <a:buChar char="•"/>
+            </a:pPr>
+            <a:r>
+              <a:rPr lang="es-MX" sz="4400" dirty="0">
+                <a:latin typeface="Century Gothic" panose="020B0502020202020204" pitchFamily="34" charset="0"/>
+                <a:ea typeface="+mj-ea"/>
+                <a:cs typeface="+mj-cs"/>
+              </a:rPr>
+              <a:t>Open-</a:t>
+            </a:r>
+            <a:r>
+              <a:rPr lang="es-MX" sz="4400" dirty="0" err="1">
+                <a:latin typeface="Century Gothic" panose="020B0502020202020204" pitchFamily="34" charset="0"/>
+                <a:ea typeface="+mj-ea"/>
+                <a:cs typeface="+mj-cs"/>
+              </a:rPr>
+              <a:t>source</a:t>
+            </a:r>
+            <a:endParaRPr lang="es-MX" sz="4400" dirty="0">
+              <a:latin typeface="Century Gothic" panose="020B0502020202020204" pitchFamily="34" charset="0"/>
+              <a:ea typeface="+mj-ea"/>
+              <a:cs typeface="+mj-cs"/>
+            </a:endParaRPr>
+          </a:p>
+          <a:p>
+            <a:pPr marL="571500" indent="-571500">
+              <a:buFont typeface="Arial" panose="020B0604020202020204" pitchFamily="34" charset="0"/>
+              <a:buChar char="•"/>
+            </a:pPr>
+            <a:r>
+              <a:rPr lang="es-MX" sz="4400" dirty="0">
+                <a:latin typeface="Century Gothic" panose="020B0502020202020204" pitchFamily="34" charset="0"/>
+                <a:ea typeface="+mj-ea"/>
+                <a:cs typeface="+mj-cs"/>
+              </a:rPr>
+              <a:t>Gratis</a:t>
+            </a:r>
+          </a:p>
+          <a:p>
+            <a:pPr marL="571500" indent="-571500">
+              <a:buFont typeface="Arial" panose="020B0604020202020204" pitchFamily="34" charset="0"/>
+              <a:buChar char="•"/>
+            </a:pPr>
+            <a:r>
+              <a:rPr lang="es-MX" sz="4400" dirty="0">
+                <a:latin typeface="Century Gothic" panose="020B0502020202020204" pitchFamily="34" charset="0"/>
+                <a:ea typeface="+mj-ea"/>
+                <a:cs typeface="+mj-cs"/>
+              </a:rPr>
+              <a:t>Licencia BSD modificada</a:t>
+            </a:r>
+          </a:p>
+          <a:p>
             <a:endParaRPr lang="es-MX" dirty="0"/>
-          </a:p>
-          <a:p>
-            <a:pPr lvl="1"/>
-            <a:r>
-              <a:rPr lang="es-MX" dirty="0" err="1"/>
-              <a:t>IJulia</a:t>
-            </a:r>
-            <a:endParaRPr lang="es-MX" dirty="0"/>
-          </a:p>
-          <a:p>
-            <a:r>
-              <a:rPr lang="es-MX" dirty="0"/>
-              <a:t>Mantenidos por la comunidad</a:t>
-            </a:r>
-          </a:p>
-          <a:p>
-            <a:pPr lvl="1"/>
-            <a:r>
-              <a:rPr lang="es-MX" dirty="0"/>
-              <a:t>Muchísimos más</a:t>
-            </a:r>
           </a:p>
         </p:txBody>
       </p:sp>
     </p:spTree>
     <p:extLst>
       <p:ext uri="{BB962C8B-B14F-4D97-AF65-F5344CB8AC3E}">
-        <p14:creationId xmlns:p14="http://schemas.microsoft.com/office/powerpoint/2010/main" val="3057316003"/>
+        <p14:creationId xmlns:p14="http://schemas.microsoft.com/office/powerpoint/2010/main" val="3042834177"/>
       </p:ext>
     </p:extLst>
   </p:cSld>
@@ -4693,7 +4648,7 @@
           <p:cNvPr id="2" name="Título 1">
             <a:extLst>
               <a:ext uri="{FF2B5EF4-FFF2-40B4-BE49-F238E27FC236}">
-                <a16:creationId xmlns:a16="http://schemas.microsoft.com/office/drawing/2014/main" id="{C0020CEC-4020-4629-A21E-DC34996FF0BB}"/>
+                <a16:creationId xmlns:a16="http://schemas.microsoft.com/office/drawing/2014/main" id="{E51F1EA5-40BA-4F87-A38B-3A8693F731B2}"/>
               </a:ext>
             </a:extLst>
           </p:cNvPr>
@@ -4711,7 +4666,7 @@
           <a:p>
             <a:r>
               <a:rPr lang="es-MX" dirty="0"/>
-              <a:t>Incluidos en Anaconda</a:t>
+              <a:t>Diferentes interfaces</a:t>
             </a:r>
           </a:p>
         </p:txBody>
@@ -4721,7 +4676,7 @@
           <p:cNvPr id="3" name="Marcador de contenido 2">
             <a:extLst>
               <a:ext uri="{FF2B5EF4-FFF2-40B4-BE49-F238E27FC236}">
-                <a16:creationId xmlns:a16="http://schemas.microsoft.com/office/drawing/2014/main" id="{2D01818D-BD0D-47B9-855A-4B9DD2E30AA1}"/>
+                <a16:creationId xmlns:a16="http://schemas.microsoft.com/office/drawing/2014/main" id="{87D98826-A1BA-43A1-BB89-F6C053DE29C7}"/>
               </a:ext>
             </a:extLst>
           </p:cNvPr>
@@ -4738,20 +4693,52 @@
           <a:lstStyle/>
           <a:p>
             <a:r>
+              <a:rPr lang="es-MX" dirty="0" err="1"/>
+              <a:t>Jupyter</a:t>
+            </a:r>
+            <a:r>
               <a:rPr lang="es-MX" dirty="0"/>
-              <a:t>Ya cuentas con ellos porque vienen en la instalación que usaste de Anaconda</a:t>
-            </a:r>
-          </a:p>
-          <a:p>
+              <a:t> </a:t>
+            </a:r>
+            <a:r>
+              <a:rPr lang="es-MX" dirty="0" err="1"/>
+              <a:t>lab</a:t>
+            </a:r>
+            <a:endParaRPr lang="es-MX" dirty="0"/>
+          </a:p>
+          <a:p>
+            <a:r>
+              <a:rPr lang="es-MX" dirty="0" err="1"/>
+              <a:t>Jupyter</a:t>
+            </a:r>
             <a:r>
               <a:rPr lang="es-MX" dirty="0"/>
-              <a:t>Sitio oficial </a:t>
-            </a:r>
-            <a:r>
-              <a:rPr lang="es-MX" dirty="0">
-                <a:hlinkClick r:id="rId2"/>
-              </a:rPr>
-              <a:t>https://jupyter.org/</a:t>
+              <a:t> </a:t>
+            </a:r>
+            <a:r>
+              <a:rPr lang="es-MX" dirty="0" err="1"/>
+              <a:t>console</a:t>
+            </a:r>
+            <a:endParaRPr lang="es-MX" dirty="0"/>
+          </a:p>
+          <a:p>
+            <a:r>
+              <a:rPr lang="es-MX" dirty="0" err="1"/>
+              <a:t>Jupyter</a:t>
+            </a:r>
+            <a:r>
+              <a:rPr lang="es-MX" dirty="0"/>
+              <a:t> notebook</a:t>
+            </a:r>
+          </a:p>
+          <a:p>
+            <a:r>
+              <a:rPr lang="es-MX" dirty="0"/>
+              <a:t>Qt </a:t>
+            </a:r>
+            <a:r>
+              <a:rPr lang="es-MX" dirty="0" err="1"/>
+              <a:t>console</a:t>
             </a:r>
             <a:endParaRPr lang="es-MX" dirty="0"/>
           </a:p>
@@ -4760,7 +4747,135 @@
     </p:spTree>
     <p:extLst>
       <p:ext uri="{BB962C8B-B14F-4D97-AF65-F5344CB8AC3E}">
-        <p14:creationId xmlns:p14="http://schemas.microsoft.com/office/powerpoint/2010/main" val="653512365"/>
+        <p14:creationId xmlns:p14="http://schemas.microsoft.com/office/powerpoint/2010/main" val="308431836"/>
+      </p:ext>
+    </p:extLst>
+  </p:cSld>
+  <p:clrMapOvr>
+    <a:masterClrMapping/>
+  </p:clrMapOvr>
+</p:sld>
+</file>
+
+<file path=ppt/slides/slide19.xml><?xml version="1.0" encoding="utf-8"?>
+<p:sld xmlns:a="http://schemas.openxmlformats.org/drawingml/2006/main" xmlns:r="http://schemas.openxmlformats.org/officeDocument/2006/relationships" xmlns:p="http://schemas.openxmlformats.org/presentationml/2006/main">
+  <p:cSld>
+    <p:spTree>
+      <p:nvGrpSpPr>
+        <p:cNvPr id="1" name=""/>
+        <p:cNvGrpSpPr/>
+        <p:nvPr/>
+      </p:nvGrpSpPr>
+      <p:grpSpPr>
+        <a:xfrm>
+          <a:off x="0" y="0"/>
+          <a:ext cx="0" cy="0"/>
+          <a:chOff x="0" y="0"/>
+          <a:chExt cx="0" cy="0"/>
+        </a:xfrm>
+      </p:grpSpPr>
+      <p:sp>
+        <p:nvSpPr>
+          <p:cNvPr id="2" name="Título 1">
+            <a:extLst>
+              <a:ext uri="{FF2B5EF4-FFF2-40B4-BE49-F238E27FC236}">
+                <a16:creationId xmlns:a16="http://schemas.microsoft.com/office/drawing/2014/main" id="{04212476-3383-4E23-ADF2-304C91030E4F}"/>
+              </a:ext>
+            </a:extLst>
+          </p:cNvPr>
+          <p:cNvSpPr>
+            <a:spLocks noGrp="1"/>
+          </p:cNvSpPr>
+          <p:nvPr>
+            <p:ph type="title"/>
+          </p:nvPr>
+        </p:nvSpPr>
+        <p:spPr/>
+        <p:txBody>
+          <a:bodyPr/>
+          <a:lstStyle/>
+          <a:p>
+            <a:r>
+              <a:rPr lang="es-MX" dirty="0"/>
+              <a:t>Diferentes </a:t>
+            </a:r>
+            <a:r>
+              <a:rPr lang="es-MX" i="1" dirty="0" err="1"/>
+              <a:t>kernels</a:t>
+            </a:r>
+            <a:endParaRPr lang="es-MX" i="1" dirty="0"/>
+          </a:p>
+        </p:txBody>
+      </p:sp>
+      <p:sp>
+        <p:nvSpPr>
+          <p:cNvPr id="3" name="Marcador de contenido 2">
+            <a:extLst>
+              <a:ext uri="{FF2B5EF4-FFF2-40B4-BE49-F238E27FC236}">
+                <a16:creationId xmlns:a16="http://schemas.microsoft.com/office/drawing/2014/main" id="{BA4CEFD1-9CA5-4D71-9BF4-D7C7467B1CB6}"/>
+              </a:ext>
+            </a:extLst>
+          </p:cNvPr>
+          <p:cNvSpPr>
+            <a:spLocks noGrp="1"/>
+          </p:cNvSpPr>
+          <p:nvPr>
+            <p:ph idx="1"/>
+          </p:nvPr>
+        </p:nvSpPr>
+        <p:spPr/>
+        <p:txBody>
+          <a:bodyPr/>
+          <a:lstStyle/>
+          <a:p>
+            <a:r>
+              <a:rPr lang="es-MX" dirty="0"/>
+              <a:t>Oficiales</a:t>
+            </a:r>
+          </a:p>
+          <a:p>
+            <a:pPr lvl="1"/>
+            <a:r>
+              <a:rPr lang="es-MX" dirty="0" err="1"/>
+              <a:t>IPython</a:t>
+            </a:r>
+            <a:endParaRPr lang="es-MX" dirty="0"/>
+          </a:p>
+          <a:p>
+            <a:pPr lvl="1"/>
+            <a:r>
+              <a:rPr lang="es-MX" dirty="0" err="1"/>
+              <a:t>IRkernel</a:t>
+            </a:r>
+            <a:endParaRPr lang="es-MX" dirty="0"/>
+          </a:p>
+          <a:p>
+            <a:pPr lvl="1"/>
+            <a:r>
+              <a:rPr lang="es-MX" dirty="0" err="1"/>
+              <a:t>IJulia</a:t>
+            </a:r>
+            <a:endParaRPr lang="es-MX" dirty="0"/>
+          </a:p>
+          <a:p>
+            <a:r>
+              <a:rPr lang="es-MX" dirty="0"/>
+              <a:t>Mantenidos por la comunidad</a:t>
+            </a:r>
+          </a:p>
+          <a:p>
+            <a:pPr lvl="1"/>
+            <a:r>
+              <a:rPr lang="es-MX" dirty="0"/>
+              <a:t>Muchísimos más</a:t>
+            </a:r>
+          </a:p>
+        </p:txBody>
+      </p:sp>
+    </p:spTree>
+    <p:extLst>
+      <p:ext uri="{BB962C8B-B14F-4D97-AF65-F5344CB8AC3E}">
+        <p14:creationId xmlns:p14="http://schemas.microsoft.com/office/powerpoint/2010/main" val="3057316003"/>
       </p:ext>
     </p:extLst>
   </p:cSld>
@@ -4885,6 +5000,105 @@
     <p:extLst>
       <p:ext uri="{BB962C8B-B14F-4D97-AF65-F5344CB8AC3E}">
         <p14:creationId xmlns:p14="http://schemas.microsoft.com/office/powerpoint/2010/main" val="3481266345"/>
+      </p:ext>
+    </p:extLst>
+  </p:cSld>
+  <p:clrMapOvr>
+    <a:masterClrMapping/>
+  </p:clrMapOvr>
+</p:sld>
+</file>
+
+<file path=ppt/slides/slide20.xml><?xml version="1.0" encoding="utf-8"?>
+<p:sld xmlns:a="http://schemas.openxmlformats.org/drawingml/2006/main" xmlns:r="http://schemas.openxmlformats.org/officeDocument/2006/relationships" xmlns:p="http://schemas.openxmlformats.org/presentationml/2006/main">
+  <p:cSld>
+    <p:spTree>
+      <p:nvGrpSpPr>
+        <p:cNvPr id="1" name=""/>
+        <p:cNvGrpSpPr/>
+        <p:nvPr/>
+      </p:nvGrpSpPr>
+      <p:grpSpPr>
+        <a:xfrm>
+          <a:off x="0" y="0"/>
+          <a:ext cx="0" cy="0"/>
+          <a:chOff x="0" y="0"/>
+          <a:chExt cx="0" cy="0"/>
+        </a:xfrm>
+      </p:grpSpPr>
+      <p:sp>
+        <p:nvSpPr>
+          <p:cNvPr id="2" name="Título 1">
+            <a:extLst>
+              <a:ext uri="{FF2B5EF4-FFF2-40B4-BE49-F238E27FC236}">
+                <a16:creationId xmlns:a16="http://schemas.microsoft.com/office/drawing/2014/main" id="{C0020CEC-4020-4629-A21E-DC34996FF0BB}"/>
+              </a:ext>
+            </a:extLst>
+          </p:cNvPr>
+          <p:cNvSpPr>
+            <a:spLocks noGrp="1"/>
+          </p:cNvSpPr>
+          <p:nvPr>
+            <p:ph type="title"/>
+          </p:nvPr>
+        </p:nvSpPr>
+        <p:spPr/>
+        <p:txBody>
+          <a:bodyPr/>
+          <a:lstStyle/>
+          <a:p>
+            <a:r>
+              <a:rPr lang="es-MX" dirty="0"/>
+              <a:t>Incluidos en Anaconda</a:t>
+            </a:r>
+          </a:p>
+        </p:txBody>
+      </p:sp>
+      <p:sp>
+        <p:nvSpPr>
+          <p:cNvPr id="3" name="Marcador de contenido 2">
+            <a:extLst>
+              <a:ext uri="{FF2B5EF4-FFF2-40B4-BE49-F238E27FC236}">
+                <a16:creationId xmlns:a16="http://schemas.microsoft.com/office/drawing/2014/main" id="{2D01818D-BD0D-47B9-855A-4B9DD2E30AA1}"/>
+              </a:ext>
+            </a:extLst>
+          </p:cNvPr>
+          <p:cNvSpPr>
+            <a:spLocks noGrp="1"/>
+          </p:cNvSpPr>
+          <p:nvPr>
+            <p:ph idx="1"/>
+          </p:nvPr>
+        </p:nvSpPr>
+        <p:spPr/>
+        <p:txBody>
+          <a:bodyPr/>
+          <a:lstStyle/>
+          <a:p>
+            <a:r>
+              <a:rPr lang="es-MX" dirty="0"/>
+              <a:t>Ya cuentas con ellos porque vienen en la instalación que usaste de Anaconda</a:t>
+            </a:r>
+          </a:p>
+          <a:p>
+            <a:r>
+              <a:rPr lang="es-MX" dirty="0"/>
+              <a:t>Sitio oficial </a:t>
+            </a:r>
+            <a:r>
+              <a:rPr lang="es-MX" dirty="0">
+                <a:hlinkClick r:id="rId2"/>
+              </a:rPr>
+              <a:t>https://jupyter.org/</a:t>
+            </a:r>
+            <a:endParaRPr lang="es-MX" dirty="0"/>
+          </a:p>
+        </p:txBody>
+      </p:sp>
+    </p:spTree>
+    <p:extLst>
+      <p:ext uri="{BB962C8B-B14F-4D97-AF65-F5344CB8AC3E}">
+        <p14:creationId xmlns:p14="http://schemas.microsoft.com/office/powerpoint/2010/main" val="653512365"/>
       </p:ext>
     </p:extLst>
   </p:cSld>
@@ -5838,7 +6052,7 @@
           <p:cNvPr id="2" name="Título 1">
             <a:extLst>
               <a:ext uri="{FF2B5EF4-FFF2-40B4-BE49-F238E27FC236}">
-                <a16:creationId xmlns:a16="http://schemas.microsoft.com/office/drawing/2014/main" id="{C994B06E-C4BF-40A1-884D-8AC9FD02393D}"/>
+                <a16:creationId xmlns:a16="http://schemas.microsoft.com/office/drawing/2014/main" id="{BFB7AB79-5E3A-4814-B77D-FADAB3C29DA7}"/>
               </a:ext>
             </a:extLst>
           </p:cNvPr>
@@ -5855,8 +6069,8 @@
           <a:lstStyle/>
           <a:p>
             <a:r>
-              <a:rPr lang="es-MX" dirty="0"/>
-              <a:t>Caso de estudio:</a:t>
+              <a:rPr lang="es-MX"/>
+              <a:t>Ejercicio 07-02</a:t>
             </a:r>
           </a:p>
         </p:txBody>
@@ -5866,7 +6080,7 @@
           <p:cNvPr id="3" name="Marcador de contenido 2">
             <a:extLst>
               <a:ext uri="{FF2B5EF4-FFF2-40B4-BE49-F238E27FC236}">
-                <a16:creationId xmlns:a16="http://schemas.microsoft.com/office/drawing/2014/main" id="{3A6F42A1-1A55-4BA7-AD66-8046D97BEEF7}"/>
+                <a16:creationId xmlns:a16="http://schemas.microsoft.com/office/drawing/2014/main" id="{9F202A13-F563-49AD-AEF9-A0F1AEDB7ACD}"/>
               </a:ext>
             </a:extLst>
           </p:cNvPr>
@@ -5882,60 +6096,14 @@
           <a:bodyPr/>
           <a:lstStyle/>
           <a:p>
-            <a:r>
-              <a:rPr lang="es-MX" dirty="0"/>
-              <a:t>Función </a:t>
-            </a:r>
-            <a:r>
-              <a:rPr lang="es-MX" dirty="0" err="1">
-                <a:solidFill>
-                  <a:srgbClr val="0070C0"/>
-                </a:solidFill>
-                <a:latin typeface="Consolas" panose="020B0609020204030204" pitchFamily="49" charset="0"/>
-              </a:rPr>
-              <a:t>p</a:t>
-            </a:r>
-            <a:r>
-              <a:rPr lang="es-MX" dirty="0" err="1">
-                <a:solidFill>
-                  <a:schemeClr val="accent1"/>
-                </a:solidFill>
-                <a:latin typeface="Consolas" panose="020B0609020204030204" pitchFamily="49" charset="0"/>
-              </a:rPr>
-              <a:t>rin</a:t>
-            </a:r>
-            <a:r>
-              <a:rPr lang="es-MX" dirty="0" err="1">
-                <a:solidFill>
-                  <a:srgbClr val="0070C0"/>
-                </a:solidFill>
-                <a:latin typeface="Consolas" panose="020B0609020204030204" pitchFamily="49" charset="0"/>
-              </a:rPr>
-              <a:t>t</a:t>
-            </a:r>
-            <a:r>
-              <a:rPr lang="es-MX" dirty="0">
-                <a:latin typeface="Consolas" panose="020B0609020204030204" pitchFamily="49" charset="0"/>
-              </a:rPr>
-              <a:t>()</a:t>
-            </a:r>
-            <a:r>
-              <a:rPr lang="es-MX" dirty="0">
-                <a:solidFill>
-                  <a:srgbClr val="0070C0"/>
-                </a:solidFill>
-                <a:latin typeface="Consolas" panose="020B0609020204030204" pitchFamily="49" charset="0"/>
-              </a:rPr>
-              <a:t> </a:t>
-            </a:r>
-            <a:endParaRPr lang="es-MX" dirty="0"/>
+            <a:endParaRPr lang="es-MX"/>
           </a:p>
         </p:txBody>
       </p:sp>
     </p:spTree>
     <p:extLst>
       <p:ext uri="{BB962C8B-B14F-4D97-AF65-F5344CB8AC3E}">
-        <p14:creationId xmlns:p14="http://schemas.microsoft.com/office/powerpoint/2010/main" val="526031103"/>
+        <p14:creationId xmlns:p14="http://schemas.microsoft.com/office/powerpoint/2010/main" val="1209215325"/>
       </p:ext>
     </p:extLst>
   </p:cSld>

</xml_diff>

<commit_message>
Session 8 and 9
</commit_message>
<xml_diff>
--- a/slides/Programación con Python07.pptx
+++ b/slides/Programación con Python07.pptx
@@ -280,7 +280,7 @@
           <a:p>
             <a:fld id="{F0BD690B-3748-411C-ABE2-76C30AC32B51}" type="datetimeFigureOut">
               <a:rPr lang="es-MX" smtClean="0"/>
-              <a:t>08/04/2020</a:t>
+              <a:t>14/04/2020</a:t>
             </a:fld>
             <a:endParaRPr lang="es-MX"/>
           </a:p>
@@ -480,7 +480,7 @@
           <a:p>
             <a:fld id="{F0BD690B-3748-411C-ABE2-76C30AC32B51}" type="datetimeFigureOut">
               <a:rPr lang="es-MX" smtClean="0"/>
-              <a:t>08/04/2020</a:t>
+              <a:t>14/04/2020</a:t>
             </a:fld>
             <a:endParaRPr lang="es-MX"/>
           </a:p>
@@ -690,7 +690,7 @@
           <a:p>
             <a:fld id="{F0BD690B-3748-411C-ABE2-76C30AC32B51}" type="datetimeFigureOut">
               <a:rPr lang="es-MX" smtClean="0"/>
-              <a:t>08/04/2020</a:t>
+              <a:t>14/04/2020</a:t>
             </a:fld>
             <a:endParaRPr lang="es-MX"/>
           </a:p>
@@ -890,7 +890,7 @@
           <a:p>
             <a:fld id="{F0BD690B-3748-411C-ABE2-76C30AC32B51}" type="datetimeFigureOut">
               <a:rPr lang="es-MX" smtClean="0"/>
-              <a:t>08/04/2020</a:t>
+              <a:t>14/04/2020</a:t>
             </a:fld>
             <a:endParaRPr lang="es-MX"/>
           </a:p>
@@ -1166,7 +1166,7 @@
           <a:p>
             <a:fld id="{F0BD690B-3748-411C-ABE2-76C30AC32B51}" type="datetimeFigureOut">
               <a:rPr lang="es-MX" smtClean="0"/>
-              <a:t>08/04/2020</a:t>
+              <a:t>14/04/2020</a:t>
             </a:fld>
             <a:endParaRPr lang="es-MX"/>
           </a:p>
@@ -1434,7 +1434,7 @@
           <a:p>
             <a:fld id="{F0BD690B-3748-411C-ABE2-76C30AC32B51}" type="datetimeFigureOut">
               <a:rPr lang="es-MX" smtClean="0"/>
-              <a:t>08/04/2020</a:t>
+              <a:t>14/04/2020</a:t>
             </a:fld>
             <a:endParaRPr lang="es-MX"/>
           </a:p>
@@ -1849,7 +1849,7 @@
           <a:p>
             <a:fld id="{F0BD690B-3748-411C-ABE2-76C30AC32B51}" type="datetimeFigureOut">
               <a:rPr lang="es-MX" smtClean="0"/>
-              <a:t>08/04/2020</a:t>
+              <a:t>14/04/2020</a:t>
             </a:fld>
             <a:endParaRPr lang="es-MX"/>
           </a:p>
@@ -1991,7 +1991,7 @@
           <a:p>
             <a:fld id="{F0BD690B-3748-411C-ABE2-76C30AC32B51}" type="datetimeFigureOut">
               <a:rPr lang="es-MX" smtClean="0"/>
-              <a:t>08/04/2020</a:t>
+              <a:t>14/04/2020</a:t>
             </a:fld>
             <a:endParaRPr lang="es-MX"/>
           </a:p>
@@ -2104,7 +2104,7 @@
           <a:p>
             <a:fld id="{F0BD690B-3748-411C-ABE2-76C30AC32B51}" type="datetimeFigureOut">
               <a:rPr lang="es-MX" smtClean="0"/>
-              <a:t>08/04/2020</a:t>
+              <a:t>14/04/2020</a:t>
             </a:fld>
             <a:endParaRPr lang="es-MX"/>
           </a:p>
@@ -2417,7 +2417,7 @@
           <a:p>
             <a:fld id="{F0BD690B-3748-411C-ABE2-76C30AC32B51}" type="datetimeFigureOut">
               <a:rPr lang="es-MX" smtClean="0"/>
-              <a:t>08/04/2020</a:t>
+              <a:t>14/04/2020</a:t>
             </a:fld>
             <a:endParaRPr lang="es-MX"/>
           </a:p>
@@ -2710,7 +2710,7 @@
           <a:p>
             <a:fld id="{F0BD690B-3748-411C-ABE2-76C30AC32B51}" type="datetimeFigureOut">
               <a:rPr lang="es-MX" smtClean="0"/>
-              <a:t>08/04/2020</a:t>
+              <a:t>14/04/2020</a:t>
             </a:fld>
             <a:endParaRPr lang="es-MX"/>
           </a:p>
@@ -2953,7 +2953,7 @@
           <a:p>
             <a:fld id="{F0BD690B-3748-411C-ABE2-76C30AC32B51}" type="datetimeFigureOut">
               <a:rPr lang="es-MX" smtClean="0"/>
-              <a:t>08/04/2020</a:t>
+              <a:t>14/04/2020</a:t>
             </a:fld>
             <a:endParaRPr lang="es-MX"/>
           </a:p>
@@ -5571,7 +5571,15 @@
           <a:p>
             <a:r>
               <a:rPr lang="es-MX" dirty="0"/>
-              <a:t>Revisa en la documentación en línea de Python cuál son.</a:t>
+              <a:t>Revisa en la documentación en línea de </a:t>
+            </a:r>
+            <a:r>
+              <a:rPr lang="es-MX"/>
+              <a:t>Python cuáles </a:t>
+            </a:r>
+            <a:r>
+              <a:rPr lang="es-MX" dirty="0"/>
+              <a:t>son.</a:t>
             </a:r>
           </a:p>
         </p:txBody>

</xml_diff>